<commit_message>
Sep 10 Lesson Updates
</commit_message>
<xml_diff>
--- a/Daily Agendas/Day2.1_GitHub1.pptx
+++ b/Daily Agendas/Day2.1_GitHub1.pptx
@@ -5,8 +5,7 @@
     <p:sldMasterId id="2147483648" r:id="rId1"/>
   </p:sldMasterIdLst>
   <p:sldIdLst>
-    <p:sldId id="258" r:id="rId2"/>
-    <p:sldId id="256" r:id="rId3"/>
+    <p:sldId id="256" r:id="rId2"/>
   </p:sldIdLst>
   <p:sldSz cx="9144000" cy="6858000" type="screen4x3"/>
   <p:notesSz cx="6858000" cy="9144000"/>
@@ -304,7 +303,7 @@
             <a:fld id="{1D8BD707-D9CF-40AE-B4C6-C98DA3205C09}" type="datetimeFigureOut">
               <a:rPr lang="en-US" smtClean="0"/>
               <a:pPr/>
-              <a:t>8/30/2018</a:t>
+              <a:t>9/10/2018</a:t>
             </a:fld>
             <a:endParaRPr lang="en-US"/>
           </a:p>
@@ -469,7 +468,7 @@
             <a:fld id="{1D8BD707-D9CF-40AE-B4C6-C98DA3205C09}" type="datetimeFigureOut">
               <a:rPr lang="en-US" smtClean="0"/>
               <a:pPr/>
-              <a:t>8/30/2018</a:t>
+              <a:t>9/10/2018</a:t>
             </a:fld>
             <a:endParaRPr lang="en-US"/>
           </a:p>
@@ -644,7 +643,7 @@
             <a:fld id="{1D8BD707-D9CF-40AE-B4C6-C98DA3205C09}" type="datetimeFigureOut">
               <a:rPr lang="en-US" smtClean="0"/>
               <a:pPr/>
-              <a:t>8/30/2018</a:t>
+              <a:t>9/10/2018</a:t>
             </a:fld>
             <a:endParaRPr lang="en-US"/>
           </a:p>
@@ -809,7 +808,7 @@
             <a:fld id="{1D8BD707-D9CF-40AE-B4C6-C98DA3205C09}" type="datetimeFigureOut">
               <a:rPr lang="en-US" smtClean="0"/>
               <a:pPr/>
-              <a:t>8/30/2018</a:t>
+              <a:t>9/10/2018</a:t>
             </a:fld>
             <a:endParaRPr lang="en-US"/>
           </a:p>
@@ -1051,7 +1050,7 @@
             <a:fld id="{1D8BD707-D9CF-40AE-B4C6-C98DA3205C09}" type="datetimeFigureOut">
               <a:rPr lang="en-US" smtClean="0"/>
               <a:pPr/>
-              <a:t>8/30/2018</a:t>
+              <a:t>9/10/2018</a:t>
             </a:fld>
             <a:endParaRPr lang="en-US"/>
           </a:p>
@@ -1333,7 +1332,7 @@
             <a:fld id="{1D8BD707-D9CF-40AE-B4C6-C98DA3205C09}" type="datetimeFigureOut">
               <a:rPr lang="en-US" smtClean="0"/>
               <a:pPr/>
-              <a:t>8/30/2018</a:t>
+              <a:t>9/10/2018</a:t>
             </a:fld>
             <a:endParaRPr lang="en-US"/>
           </a:p>
@@ -1749,7 +1748,7 @@
             <a:fld id="{1D8BD707-D9CF-40AE-B4C6-C98DA3205C09}" type="datetimeFigureOut">
               <a:rPr lang="en-US" smtClean="0"/>
               <a:pPr/>
-              <a:t>8/30/2018</a:t>
+              <a:t>9/10/2018</a:t>
             </a:fld>
             <a:endParaRPr lang="en-US"/>
           </a:p>
@@ -1863,7 +1862,7 @@
             <a:fld id="{1D8BD707-D9CF-40AE-B4C6-C98DA3205C09}" type="datetimeFigureOut">
               <a:rPr lang="en-US" smtClean="0"/>
               <a:pPr/>
-              <a:t>8/30/2018</a:t>
+              <a:t>9/10/2018</a:t>
             </a:fld>
             <a:endParaRPr lang="en-US"/>
           </a:p>
@@ -1955,7 +1954,7 @@
             <a:fld id="{1D8BD707-D9CF-40AE-B4C6-C98DA3205C09}" type="datetimeFigureOut">
               <a:rPr lang="en-US" smtClean="0"/>
               <a:pPr/>
-              <a:t>8/30/2018</a:t>
+              <a:t>9/10/2018</a:t>
             </a:fld>
             <a:endParaRPr lang="en-US"/>
           </a:p>
@@ -2227,7 +2226,7 @@
             <a:fld id="{1D8BD707-D9CF-40AE-B4C6-C98DA3205C09}" type="datetimeFigureOut">
               <a:rPr lang="en-US" smtClean="0"/>
               <a:pPr/>
-              <a:t>8/30/2018</a:t>
+              <a:t>9/10/2018</a:t>
             </a:fld>
             <a:endParaRPr lang="en-US"/>
           </a:p>
@@ -2476,7 +2475,7 @@
             <a:fld id="{1D8BD707-D9CF-40AE-B4C6-C98DA3205C09}" type="datetimeFigureOut">
               <a:rPr lang="en-US" smtClean="0"/>
               <a:pPr/>
-              <a:t>8/30/2018</a:t>
+              <a:t>9/10/2018</a:t>
             </a:fld>
             <a:endParaRPr lang="en-US"/>
           </a:p>
@@ -2684,7 +2683,7 @@
             <a:fld id="{1D8BD707-D9CF-40AE-B4C6-C98DA3205C09}" type="datetimeFigureOut">
               <a:rPr lang="en-US" smtClean="0"/>
               <a:pPr/>
-              <a:t>8/30/2018</a:t>
+              <a:t>9/10/2018</a:t>
             </a:fld>
             <a:endParaRPr lang="en-US"/>
           </a:p>
@@ -3062,143 +3061,48 @@
             <a:spLocks noGrp="1"/>
           </p:cNvSpPr>
           <p:nvPr>
-            <p:ph type="ctrTitle"/>
+            <p:ph type="title"/>
+          </p:nvPr>
+        </p:nvSpPr>
+        <p:spPr/>
+        <p:txBody>
+          <a:bodyPr/>
+          <a:lstStyle/>
+          <a:p>
+            <a:r>
+              <a:rPr lang="en-US" dirty="0"/>
+              <a:t>Module </a:t>
+            </a:r>
+            <a:r>
+              <a:rPr lang="en-US" dirty="0" smtClean="0"/>
+              <a:t>D1.1 </a:t>
+            </a:r>
+            <a:r>
+              <a:rPr lang="en-US" dirty="0"/>
+              <a:t>– Sep </a:t>
+            </a:r>
+            <a:r>
+              <a:rPr lang="en-US" dirty="0" smtClean="0"/>
+              <a:t>10</a:t>
+            </a:r>
+            <a:endParaRPr lang="en-US" dirty="0"/>
+          </a:p>
+        </p:txBody>
+      </p:sp>
+      <p:sp>
+        <p:nvSpPr>
+          <p:cNvPr id="5" name="Content Placeholder 4"/>
+          <p:cNvSpPr>
+            <a:spLocks noGrp="1"/>
+          </p:cNvSpPr>
+          <p:nvPr>
+            <p:ph idx="1"/>
           </p:nvPr>
         </p:nvSpPr>
         <p:spPr/>
         <p:txBody>
           <a:bodyPr>
-            <a:normAutofit fontScale="90000"/>
-          </a:bodyPr>
-          <a:lstStyle/>
-          <a:p>
-            <a:r>
-              <a:rPr lang="en-US" sz="5300" dirty="0"/>
-              <a:t>ICS2O0</a:t>
-            </a:r>
-            <a:br>
-              <a:rPr lang="en-US" sz="5300" dirty="0"/>
-            </a:br>
-            <a:r>
-              <a:rPr lang="en-US" dirty="0"/>
-              <a:t>(</a:t>
-            </a:r>
-            <a:r>
-              <a:rPr lang="en-US" sz="4000" dirty="0"/>
-              <a:t>Grade 10 Computer Science</a:t>
-            </a:r>
-            <a:r>
-              <a:rPr lang="en-US" dirty="0"/>
-              <a:t>)</a:t>
-            </a:r>
-          </a:p>
-        </p:txBody>
-      </p:sp>
-      <p:sp>
-        <p:nvSpPr>
-          <p:cNvPr id="5" name="Subtitle 4"/>
-          <p:cNvSpPr>
-            <a:spLocks noGrp="1"/>
-          </p:cNvSpPr>
-          <p:nvPr>
-            <p:ph type="subTitle" idx="1"/>
-          </p:nvPr>
-        </p:nvSpPr>
-        <p:spPr/>
-        <p:txBody>
-          <a:bodyPr/>
-          <a:lstStyle/>
-          <a:p>
-            <a:r>
-              <a:rPr lang="en-US" dirty="0"/>
-              <a:t>Mr. Nestor</a:t>
-            </a:r>
-          </a:p>
-          <a:p>
-            <a:r>
-              <a:rPr lang="en-US" dirty="0"/>
-              <a:t>(</a:t>
-            </a:r>
-            <a:r>
-              <a:rPr lang="en-US" dirty="0">
-                <a:hlinkClick r:id="rId2"/>
-              </a:rPr>
-              <a:t>gregory.nestor@peelsb.com</a:t>
-            </a:r>
-            <a:r>
-              <a:rPr lang="en-US" dirty="0"/>
-              <a:t>)</a:t>
-            </a:r>
-          </a:p>
-          <a:p>
-            <a:r>
-              <a:rPr lang="en-US" dirty="0"/>
-              <a:t>(p0079141@pdsb.net)</a:t>
-            </a:r>
-          </a:p>
-        </p:txBody>
-      </p:sp>
-    </p:spTree>
-  </p:cSld>
-  <p:clrMapOvr>
-    <a:masterClrMapping/>
-  </p:clrMapOvr>
-</p:sld>
-</file>
-
-<file path=ppt/slides/slide2.xml><?xml version="1.0" encoding="utf-8"?>
-<p:sld xmlns:a="http://schemas.openxmlformats.org/drawingml/2006/main" xmlns:r="http://schemas.openxmlformats.org/officeDocument/2006/relationships" xmlns:p="http://schemas.openxmlformats.org/presentationml/2006/main">
-  <p:cSld>
-    <p:spTree>
-      <p:nvGrpSpPr>
-        <p:cNvPr id="1" name=""/>
-        <p:cNvGrpSpPr/>
-        <p:nvPr/>
-      </p:nvGrpSpPr>
-      <p:grpSpPr>
-        <a:xfrm>
-          <a:off x="0" y="0"/>
-          <a:ext cx="0" cy="0"/>
-          <a:chOff x="0" y="0"/>
-          <a:chExt cx="0" cy="0"/>
-        </a:xfrm>
-      </p:grpSpPr>
-      <p:sp>
-        <p:nvSpPr>
-          <p:cNvPr id="4" name="Title 3"/>
-          <p:cNvSpPr>
-            <a:spLocks noGrp="1"/>
-          </p:cNvSpPr>
-          <p:nvPr>
-            <p:ph type="title"/>
-          </p:nvPr>
-        </p:nvSpPr>
-        <p:spPr/>
-        <p:txBody>
-          <a:bodyPr/>
-          <a:lstStyle/>
-          <a:p>
-            <a:r>
-              <a:rPr lang="en-US" dirty="0"/>
-              <a:t>Module D1.1 – Sep 10</a:t>
-            </a:r>
-          </a:p>
-        </p:txBody>
-      </p:sp>
-      <p:sp>
-        <p:nvSpPr>
-          <p:cNvPr id="5" name="Content Placeholder 4"/>
-          <p:cNvSpPr>
-            <a:spLocks noGrp="1"/>
-          </p:cNvSpPr>
-          <p:nvPr>
-            <p:ph idx="1"/>
-          </p:nvPr>
-        </p:nvSpPr>
-        <p:spPr/>
-        <p:txBody>
-          <a:bodyPr>
-            <a:normAutofit/>
+            <a:normAutofit lnSpcReduction="10000"/>
           </a:bodyPr>
           <a:lstStyle/>
           <a:p>
@@ -3210,23 +3114,49 @@
           <a:p>
             <a:pPr lvl="1"/>
             <a:r>
+              <a:rPr lang="en-US" dirty="0" smtClean="0"/>
+              <a:t>Seating Plan / Attendance </a:t>
+            </a:r>
+          </a:p>
+          <a:p>
+            <a:pPr lvl="1"/>
+            <a:r>
+              <a:rPr lang="en-US" dirty="0" smtClean="0"/>
+              <a:t>Discussion</a:t>
+            </a:r>
+            <a:r>
               <a:rPr lang="en-US" dirty="0"/>
-              <a:t>Attendance / Introductions</a:t>
-            </a:r>
+              <a:t>: </a:t>
+            </a:r>
+            <a:r>
+              <a:rPr lang="en-US" dirty="0" err="1" smtClean="0"/>
+              <a:t>GitHub</a:t>
+            </a:r>
+            <a:r>
+              <a:rPr lang="en-US" dirty="0" smtClean="0"/>
+              <a:t> – Version Control Systems</a:t>
+            </a:r>
+            <a:endParaRPr lang="en-US" dirty="0"/>
           </a:p>
           <a:p>
             <a:pPr lvl="1"/>
             <a:r>
-              <a:rPr lang="en-US" dirty="0"/>
-              <a:t>Discussion: Course Outline / GitHub</a:t>
-            </a:r>
-          </a:p>
-          <a:p>
-            <a:pPr lvl="1"/>
-            <a:r>
               <a:rPr lang="en-CA" dirty="0"/>
-              <a:t>Module D1.1 – GitHub – Level 1</a:t>
-            </a:r>
+              <a:t>Module </a:t>
+            </a:r>
+            <a:r>
+              <a:rPr lang="en-CA" dirty="0" smtClean="0"/>
+              <a:t>D1 – </a:t>
+            </a:r>
+            <a:r>
+              <a:rPr lang="en-CA" dirty="0" err="1" smtClean="0"/>
+              <a:t>GitHub</a:t>
+            </a:r>
+            <a:r>
+              <a:rPr lang="en-CA" dirty="0" smtClean="0"/>
+              <a:t> Introduction – Level 1 &amp; 2</a:t>
+            </a:r>
+            <a:endParaRPr lang="en-CA" dirty="0"/>
           </a:p>
           <a:p>
             <a:pPr lvl="1">
@@ -3249,9 +3179,25 @@
           <a:p>
             <a:pPr lvl="1"/>
             <a:r>
-              <a:rPr lang="en-US" dirty="0"/>
-              <a:t>Tomorrow: More GitHub</a:t>
-            </a:r>
+              <a:rPr lang="en-US" dirty="0" smtClean="0"/>
+              <a:t>Due: Mod A.1 – Simon Game</a:t>
+            </a:r>
+          </a:p>
+          <a:p>
+            <a:pPr lvl="1"/>
+            <a:r>
+              <a:rPr lang="en-US" dirty="0" smtClean="0"/>
+              <a:t>Tomorrow: </a:t>
+            </a:r>
+            <a:r>
+              <a:rPr lang="en-US" dirty="0" err="1" smtClean="0"/>
+              <a:t>GitHub</a:t>
+            </a:r>
+            <a:r>
+              <a:rPr lang="en-US" dirty="0" smtClean="0"/>
+              <a:t> Level 2 &amp; 3</a:t>
+            </a:r>
+            <a:endParaRPr lang="en-US" dirty="0"/>
           </a:p>
         </p:txBody>
       </p:sp>

</xml_diff>